<commit_message>
added slide html 0 and 1
</commit_message>
<xml_diff>
--- a/HTML-CSS-JS/slides/0-Greeting.pptx
+++ b/HTML-CSS-JS/slides/0-Greeting.pptx
@@ -1026,7 +1026,7 @@
                 </a:solidFill>
                 <a:latin typeface="Lato" panose="020F0502020204030203" pitchFamily="34" charset="0"/>
               </a:rPr>
-              <a:t> Introduction &amp; PHP Basic &amp; PHP Advanced : 8 hours – 2 sessions.</a:t>
+              <a:t> Introduction &amp; Environment : 8 hours – 2 sessions.</a:t>
             </a:r>
           </a:p>
           <a:p>
@@ -1044,7 +1044,7 @@
                 </a:solidFill>
                 <a:latin typeface="Lato" panose="020F0502020204030203" pitchFamily="34" charset="0"/>
               </a:rPr>
-              <a:t>MySQL &amp; PHP connect to Database : 8 hours – 2 sessions.</a:t>
+              <a:t> HTML &amp; CSS &amp; Bootstrap 4 : 16 hours – 4 sessions.</a:t>
             </a:r>
           </a:p>
           <a:p>
@@ -1062,7 +1062,7 @@
                 </a:solidFill>
                 <a:latin typeface="Lato" panose="020F0502020204030203" pitchFamily="34" charset="0"/>
               </a:rPr>
-              <a:t>PHP OOP &amp; PHP MVC : 12 hours – 3 sessions.</a:t>
+              <a:t>JavaScript : 8 hours – 2 sessions.</a:t>
             </a:r>
           </a:p>
           <a:p>
@@ -1080,7 +1080,7 @@
                 </a:solidFill>
                 <a:latin typeface="Lato" panose="020F0502020204030203" pitchFamily="34" charset="0"/>
               </a:rPr>
-              <a:t>Using Laravel Framework and MySQL to build Blog Website : 32 hours – 8 sessions.</a:t>
+              <a:t>Project News Website Template : 32 hours – 7 sessions.</a:t>
             </a:r>
           </a:p>
         </p:txBody>
@@ -1100,7 +1100,7 @@
         <p:spPr>
           <a:xfrm>
             <a:off x="279402" y="5530780"/>
-            <a:ext cx="10673435" cy="453137"/>
+            <a:ext cx="6971780" cy="453137"/>
           </a:xfrm>
           <a:prstGeom prst="rect">
             <a:avLst/>
@@ -1126,7 +1126,7 @@
                 <a:latin typeface="Lato Light" panose="020F0302020204030203" pitchFamily="34" charset="0"/>
                 <a:ea typeface="Roboto Light" panose="02000000000000000000" pitchFamily="2" charset="0"/>
               </a:rPr>
-              <a:t>* Git, Docker, IDE plugin, LEMP/LAMP stack, RESTFUL API and some stuff will be additional in each session.</a:t>
+              <a:t>* Git, VS Code, Ubuntu, Command Line will be guided in some session.</a:t>
             </a:r>
             <a:endParaRPr lang="en-US" sz="1200" dirty="0">
               <a:solidFill>
@@ -1730,8 +1730,8 @@
         </p:nvSpPr>
         <p:spPr>
           <a:xfrm>
-            <a:off x="279401" y="2044341"/>
-            <a:ext cx="11633198" cy="3343351"/>
+            <a:off x="2146558" y="2044341"/>
+            <a:ext cx="8323686" cy="2862322"/>
           </a:xfrm>
           <a:prstGeom prst="rect">
             <a:avLst/>
@@ -1758,7 +1758,7 @@
                 </a:solidFill>
                 <a:latin typeface="Lato" panose="020F0502020204030203" pitchFamily="34" charset="0"/>
               </a:rPr>
-              <a:t>Php.net</a:t>
+              <a:t>Freecodecamp.org</a:t>
             </a:r>
           </a:p>
           <a:p>
@@ -1776,7 +1776,7 @@
                 </a:solidFill>
                 <a:latin typeface="Lato" panose="020F0502020204030203" pitchFamily="34" charset="0"/>
               </a:rPr>
-              <a:t>Laravel.com</a:t>
+              <a:t>W3schools.com</a:t>
             </a:r>
           </a:p>
           <a:p>
@@ -1794,7 +1794,7 @@
                 </a:solidFill>
                 <a:latin typeface="Lato" panose="020F0502020204030203" pitchFamily="34" charset="0"/>
               </a:rPr>
-              <a:t>W3schools.com</a:t>
+              <a:t>Udemy.com</a:t>
             </a:r>
           </a:p>
           <a:p>
@@ -1812,43 +1812,7 @@
                 </a:solidFill>
                 <a:latin typeface="Lato" panose="020F0502020204030203" pitchFamily="34" charset="0"/>
               </a:rPr>
-              <a:t>Udemy.com</a:t>
-            </a:r>
-          </a:p>
-          <a:p>
-            <a:pPr marL="342900" indent="-342900">
-              <a:lnSpc>
-                <a:spcPct val="150000"/>
-              </a:lnSpc>
-              <a:buFont typeface="Wingdings" panose="05000000000000000000" pitchFamily="2" charset="2"/>
-              <a:buChar char="§"/>
-            </a:pPr>
-            <a:r>
-              <a:rPr lang="en-US" sz="2400" dirty="0">
-                <a:solidFill>
-                  <a:schemeClr val="bg1"/>
-                </a:solidFill>
-                <a:latin typeface="Lato" panose="020F0502020204030203" pitchFamily="34" charset="0"/>
-              </a:rPr>
               <a:t>Lynda.com</a:t>
-            </a:r>
-          </a:p>
-          <a:p>
-            <a:pPr marL="342900" indent="-342900">
-              <a:lnSpc>
-                <a:spcPct val="150000"/>
-              </a:lnSpc>
-              <a:buFont typeface="Wingdings" panose="05000000000000000000" pitchFamily="2" charset="2"/>
-              <a:buChar char="§"/>
-            </a:pPr>
-            <a:r>
-              <a:rPr lang="en-US" sz="2400" dirty="0">
-                <a:solidFill>
-                  <a:schemeClr val="bg1"/>
-                </a:solidFill>
-                <a:latin typeface="Lato" panose="020F0502020204030203" pitchFamily="34" charset="0"/>
-              </a:rPr>
-              <a:t>Laracasts.com</a:t>
             </a:r>
           </a:p>
           <a:p>
@@ -2318,8 +2282,8 @@
         </p:nvSpPr>
         <p:spPr>
           <a:xfrm>
-            <a:off x="666330" y="2274838"/>
-            <a:ext cx="10859338" cy="2308324"/>
+            <a:off x="666330" y="1691640"/>
+            <a:ext cx="10859338" cy="3474720"/>
           </a:xfrm>
           <a:prstGeom prst="rect">
             <a:avLst/>
@@ -2385,7 +2349,7 @@
                 <a:latin typeface="Lato" panose="020F0502020204030203" pitchFamily="34" charset="0"/>
                 <a:ea typeface="Roboto" panose="02000000000000000000" pitchFamily="2" charset="0"/>
               </a:rPr>
-              <a:t>Install Visual Studio Code Text Editor.</a:t>
+              <a:t>Install Visual Studio Code Text Editor – with extensions :  Beautify, Bootstrap 4 Snippet, HTML Snippets, Live Server.</a:t>
             </a:r>
           </a:p>
           <a:p>
@@ -2404,7 +2368,37 @@
                 <a:latin typeface="Lato" panose="020F0502020204030203" pitchFamily="34" charset="0"/>
                 <a:ea typeface="Roboto" panose="02000000000000000000" pitchFamily="2" charset="0"/>
               </a:rPr>
-              <a:t>Chrome Web Browser.</a:t>
+              <a:t>Chrome Web Browser – with extensions : </a:t>
+            </a:r>
+            <a:r>
+              <a:rPr lang="en-US" sz="2400" dirty="0" err="1">
+                <a:solidFill>
+                  <a:schemeClr val="bg1"/>
+                </a:solidFill>
+                <a:latin typeface="Lato" panose="020F0502020204030203" pitchFamily="34" charset="0"/>
+                <a:ea typeface="Roboto" panose="02000000000000000000" pitchFamily="2" charset="0"/>
+              </a:rPr>
+              <a:t>Ddict</a:t>
+            </a:r>
+            <a:r>
+              <a:rPr lang="en-US" sz="2400" dirty="0">
+                <a:solidFill>
+                  <a:schemeClr val="bg1"/>
+                </a:solidFill>
+                <a:latin typeface="Lato" panose="020F0502020204030203" pitchFamily="34" charset="0"/>
+                <a:ea typeface="Roboto" panose="02000000000000000000" pitchFamily="2" charset="0"/>
+              </a:rPr>
+              <a:t> Translate, Color </a:t>
+            </a:r>
+            <a:r>
+              <a:rPr lang="en-US" sz="2400" dirty="0" err="1">
+                <a:solidFill>
+                  <a:schemeClr val="bg1"/>
+                </a:solidFill>
+                <a:latin typeface="Lato" panose="020F0502020204030203" pitchFamily="34" charset="0"/>
+                <a:ea typeface="Roboto" panose="02000000000000000000" pitchFamily="2" charset="0"/>
+              </a:rPr>
+              <a:t>Zilla</a:t>
             </a:r>
             <a:endParaRPr lang="vi-VN" sz="2400" dirty="0">
               <a:solidFill>
@@ -3488,7 +3482,7 @@
                 </a:solidFill>
                 <a:latin typeface="Lato" panose="020F0502020204030203" pitchFamily="34" charset="0"/>
               </a:rPr>
-              <a:t>No Facebook, no YouTube, no Twitch, no connect to people outside if it’s not an emergency …</a:t>
+              <a:t>No Facebook, no YouTube, no Twitch, no Mobile, no connect to people outside if it’s not an emergency …</a:t>
             </a:r>
           </a:p>
           <a:p>

</xml_diff>

<commit_message>
fixed html and php slides
</commit_message>
<xml_diff>
--- a/HTML-CSS-JS/slides/0-Greeting.pptx
+++ b/HTML-CSS-JS/slides/0-Greeting.pptx
@@ -1044,7 +1044,7 @@
                 </a:solidFill>
                 <a:latin typeface="Lato" panose="020F0502020204030203" pitchFamily="34" charset="0"/>
               </a:rPr>
-              <a:t> HTML &amp; CSS &amp; Bootstrap 4 : 16 hours – 4 sessions.</a:t>
+              <a:t> HTML &amp; CSS &amp; Bootstrap 4 : 28 hours – 7 sessions.</a:t>
             </a:r>
           </a:p>
           <a:p>
@@ -1080,7 +1080,7 @@
                 </a:solidFill>
                 <a:latin typeface="Lato" panose="020F0502020204030203" pitchFamily="34" charset="0"/>
               </a:rPr>
-              <a:t>Project News Website Template : 32 hours – 7 sessions.</a:t>
+              <a:t>Project News Website Template : 16 hours – 4 sessions.</a:t>
             </a:r>
           </a:p>
         </p:txBody>
@@ -2282,8 +2282,8 @@
         </p:nvSpPr>
         <p:spPr>
           <a:xfrm>
-            <a:off x="666330" y="1691640"/>
-            <a:ext cx="10859338" cy="3474720"/>
+            <a:off x="666330" y="1601588"/>
+            <a:ext cx="10859338" cy="3749040"/>
           </a:xfrm>
           <a:prstGeom prst="rect">
             <a:avLst/>
@@ -2304,6 +2304,16 @@
               <a:buAutoNum type="arabicPeriod"/>
             </a:pPr>
             <a:r>
+              <a:rPr lang="en-US" sz="2400">
+                <a:solidFill>
+                  <a:schemeClr val="bg1"/>
+                </a:solidFill>
+                <a:latin typeface="Lato" panose="020F0502020204030203" pitchFamily="34" charset="0"/>
+                <a:ea typeface="Roboto" panose="02000000000000000000" pitchFamily="2" charset="0"/>
+              </a:rPr>
+              <a:t>Using Windows 10 </a:t>
+            </a:r>
+            <a:r>
               <a:rPr lang="en-US" sz="2400" dirty="0">
                 <a:solidFill>
                   <a:schemeClr val="bg1"/>
@@ -2311,7 +2321,7 @@
                 <a:latin typeface="Lato" panose="020F0502020204030203" pitchFamily="34" charset="0"/>
                 <a:ea typeface="Roboto" panose="02000000000000000000" pitchFamily="2" charset="0"/>
               </a:rPr>
-              <a:t>Using Windows.</a:t>
+              <a:t>or Ubuntu 16.04.</a:t>
             </a:r>
           </a:p>
           <a:p>
@@ -2330,7 +2340,7 @@
                 <a:latin typeface="Lato" panose="020F0502020204030203" pitchFamily="34" charset="0"/>
                 <a:ea typeface="Roboto" panose="02000000000000000000" pitchFamily="2" charset="0"/>
               </a:rPr>
-              <a:t>Install Git.</a:t>
+              <a:t>Installed Git.</a:t>
             </a:r>
           </a:p>
           <a:p>
@@ -2349,7 +2359,7 @@
                 <a:latin typeface="Lato" panose="020F0502020204030203" pitchFamily="34" charset="0"/>
                 <a:ea typeface="Roboto" panose="02000000000000000000" pitchFamily="2" charset="0"/>
               </a:rPr>
-              <a:t>Install Visual Studio Code Text Editor – with extensions :  Beautify, Bootstrap 4 Snippet, HTML Snippets, Live Server.</a:t>
+              <a:t>Installed Visual Studio Code – with extensions with extensions : Live server, Prettier, HTML CSS Support, IntelliSense for CSS classes, Auto Close Tag, HTML Snippets, Bootstrap 4 Snippets, Material Theme, Material Icons …</a:t>
             </a:r>
           </a:p>
           <a:p>
@@ -2388,17 +2398,7 @@
                 <a:latin typeface="Lato" panose="020F0502020204030203" pitchFamily="34" charset="0"/>
                 <a:ea typeface="Roboto" panose="02000000000000000000" pitchFamily="2" charset="0"/>
               </a:rPr>
-              <a:t> Translate, Color </a:t>
-            </a:r>
-            <a:r>
-              <a:rPr lang="en-US" sz="2400" dirty="0" err="1">
-                <a:solidFill>
-                  <a:schemeClr val="bg1"/>
-                </a:solidFill>
-                <a:latin typeface="Lato" panose="020F0502020204030203" pitchFamily="34" charset="0"/>
-                <a:ea typeface="Roboto" panose="02000000000000000000" pitchFamily="2" charset="0"/>
-              </a:rPr>
-              <a:t>Zilla</a:t>
+              <a:t> Translate.</a:t>
             </a:r>
             <a:endParaRPr lang="vi-VN" sz="2400" dirty="0">
               <a:solidFill>

</xml_diff>

<commit_message>
updated slide html 0
</commit_message>
<xml_diff>
--- a/HTML-CSS-JS/slides/0-Greeting.pptx
+++ b/HTML-CSS-JS/slides/0-Greeting.pptx
@@ -1026,7 +1026,7 @@
                 </a:solidFill>
                 <a:latin typeface="Lato" panose="020F0502020204030203" pitchFamily="34" charset="0"/>
               </a:rPr>
-              <a:t> Introduction &amp; Environment : 8 hours – 2 sessions.</a:t>
+              <a:t> Introduction &amp; Environment : 4 hours – 1 sessions.</a:t>
             </a:r>
           </a:p>
           <a:p>
@@ -1044,7 +1044,7 @@
                 </a:solidFill>
                 <a:latin typeface="Lato" panose="020F0502020204030203" pitchFamily="34" charset="0"/>
               </a:rPr>
-              <a:t> HTML &amp; CSS &amp; Bootstrap 4 : 28 hours – 7 sessions.</a:t>
+              <a:t> HTML &amp; CSS &amp; Bootstrap 4 : 32 hours – 8 sessions.</a:t>
             </a:r>
           </a:p>
           <a:p>
@@ -1062,7 +1062,7 @@
                 </a:solidFill>
                 <a:latin typeface="Lato" panose="020F0502020204030203" pitchFamily="34" charset="0"/>
               </a:rPr>
-              <a:t>JavaScript : 8 hours – 2 sessions.</a:t>
+              <a:t>JavaScript &amp; jQuery &amp; AJAX &amp; JSON : 16 hours – 4 sessions.</a:t>
             </a:r>
           </a:p>
           <a:p>
@@ -1080,7 +1080,7 @@
                 </a:solidFill>
                 <a:latin typeface="Lato" panose="020F0502020204030203" pitchFamily="34" charset="0"/>
               </a:rPr>
-              <a:t>Project News Website Template : 16 hours – 4 sessions.</a:t>
+              <a:t>Project News Website Template : 8 hours – 2 sessions.</a:t>
             </a:r>
           </a:p>
         </p:txBody>
@@ -1100,7 +1100,7 @@
         <p:spPr>
           <a:xfrm>
             <a:off x="279402" y="5530780"/>
-            <a:ext cx="6971780" cy="453137"/>
+            <a:ext cx="7567136" cy="453137"/>
           </a:xfrm>
           <a:prstGeom prst="rect">
             <a:avLst/>
@@ -1126,7 +1126,7 @@
                 <a:latin typeface="Lato Light" panose="020F0302020204030203" pitchFamily="34" charset="0"/>
                 <a:ea typeface="Roboto Light" panose="02000000000000000000" pitchFamily="2" charset="0"/>
               </a:rPr>
-              <a:t>* Git, VS Code, Ubuntu, Command Line will be guided in some session.</a:t>
+              <a:t>* Git Hub, Git Page, VS Code, Command Line will be guided in some session.</a:t>
             </a:r>
             <a:endParaRPr lang="en-US" sz="1200" dirty="0">
               <a:solidFill>
@@ -2677,7 +2677,7 @@
                 </a:solidFill>
                 <a:latin typeface="Lato" panose="020F0502020204030203" pitchFamily="34" charset="0"/>
               </a:rPr>
-              <a:t>Full-Stack Web Developer at Pageworth.com.</a:t>
+              <a:t>Software Engineering at Axon Active Viet Nam.</a:t>
             </a:r>
           </a:p>
           <a:p>

</xml_diff>

<commit_message>
Updated Slide + Added web stack slide + Changed web developer roadmap + Removed some resource
</commit_message>
<xml_diff>
--- a/HTML-CSS-JS/slides/0-Greeting.pptx
+++ b/HTML-CSS-JS/slides/0-Greeting.pptx
@@ -14,8 +14,8 @@
     <p:sldId id="263" r:id="rId8"/>
     <p:sldId id="265" r:id="rId9"/>
     <p:sldId id="266" r:id="rId10"/>
-    <p:sldId id="267" r:id="rId11"/>
-    <p:sldId id="268" r:id="rId12"/>
+    <p:sldId id="268" r:id="rId11"/>
+    <p:sldId id="272" r:id="rId12"/>
     <p:sldId id="260" r:id="rId13"/>
     <p:sldId id="269" r:id="rId14"/>
     <p:sldId id="271" r:id="rId15"/>
@@ -702,10 +702,10 @@
       </p:sp>
       <p:pic>
         <p:nvPicPr>
-          <p:cNvPr id="4" name="Picture 3">
-            <a:extLst>
-              <a:ext uri="{FF2B5EF4-FFF2-40B4-BE49-F238E27FC236}">
-                <a16:creationId xmlns:a16="http://schemas.microsoft.com/office/drawing/2014/main" id="{6C1B0088-BBA3-409F-A336-A19288C3F6CF}"/>
+          <p:cNvPr id="4" name="Picture 3" descr="A screenshot of a cell phone&#13;&#10;&#13;&#10;Description automatically generated">
+            <a:extLst>
+              <a:ext uri="{FF2B5EF4-FFF2-40B4-BE49-F238E27FC236}">
+                <a16:creationId xmlns:a16="http://schemas.microsoft.com/office/drawing/2014/main" id="{87EFBC4E-FC61-FA43-BAF1-7B2917AE43F0}"/>
               </a:ext>
             </a:extLst>
           </p:cNvPr>
@@ -728,8 +728,8 @@
         </p:blipFill>
         <p:spPr>
           <a:xfrm>
-            <a:off x="1040102" y="0"/>
-            <a:ext cx="10113002" cy="6858817"/>
+            <a:off x="4188251" y="0"/>
+            <a:ext cx="3815497" cy="6858000"/>
           </a:xfrm>
           <a:prstGeom prst="rect">
             <a:avLst/>
@@ -739,7 +739,7 @@
     </p:spTree>
     <p:extLst>
       <p:ext uri="{BB962C8B-B14F-4D97-AF65-F5344CB8AC3E}">
-        <p14:creationId xmlns:p14="http://schemas.microsoft.com/office/powerpoint/2010/main" val="1227699268"/>
+        <p14:creationId xmlns:p14="http://schemas.microsoft.com/office/powerpoint/2010/main" val="2524236270"/>
       </p:ext>
     </p:extLst>
   </p:cSld>
@@ -766,52 +766,12 @@
           <a:chExt cx="0" cy="0"/>
         </a:xfrm>
       </p:grpSpPr>
-      <p:sp>
-        <p:nvSpPr>
-          <p:cNvPr id="3" name="TextBox 2">
-            <a:extLst>
-              <a:ext uri="{FF2B5EF4-FFF2-40B4-BE49-F238E27FC236}">
-                <a16:creationId xmlns:a16="http://schemas.microsoft.com/office/drawing/2014/main" id="{721AD11B-6019-4245-85C7-F68C7DB422FC}"/>
-              </a:ext>
-            </a:extLst>
-          </p:cNvPr>
-          <p:cNvSpPr txBox="1"/>
-          <p:nvPr/>
-        </p:nvSpPr>
-        <p:spPr>
-          <a:xfrm>
-            <a:off x="1980674" y="1475277"/>
-            <a:ext cx="8230651" cy="646331"/>
-          </a:xfrm>
-          <a:prstGeom prst="rect">
-            <a:avLst/>
-          </a:prstGeom>
-          <a:noFill/>
-        </p:spPr>
-        <p:txBody>
-          <a:bodyPr wrap="none" rtlCol="0">
-            <a:spAutoFit/>
-          </a:bodyPr>
-          <a:lstStyle/>
-          <a:p>
-            <a:r>
-              <a:rPr lang="en-US" sz="3600" dirty="0">
-                <a:solidFill>
-                  <a:schemeClr val="bg1"/>
-                </a:solidFill>
-                <a:latin typeface="Lato" panose="020F0502020204030203" pitchFamily="34" charset="0"/>
-              </a:rPr>
-              <a:t>FROM WHAT YOU ARE LOOKING FOR</a:t>
-            </a:r>
-          </a:p>
-        </p:txBody>
-      </p:sp>
       <p:pic>
         <p:nvPicPr>
-          <p:cNvPr id="5" name="Picture 4">
-            <a:extLst>
-              <a:ext uri="{FF2B5EF4-FFF2-40B4-BE49-F238E27FC236}">
-                <a16:creationId xmlns:a16="http://schemas.microsoft.com/office/drawing/2014/main" id="{7A681369-9141-45F3-A446-FBAE12D7B0C7}"/>
+          <p:cNvPr id="3" name="Picture 2">
+            <a:extLst>
+              <a:ext uri="{FF2B5EF4-FFF2-40B4-BE49-F238E27FC236}">
+                <a16:creationId xmlns:a16="http://schemas.microsoft.com/office/drawing/2014/main" id="{58DA6E02-6BD0-5640-AFF2-31682E3B2B1D}"/>
               </a:ext>
             </a:extLst>
           </p:cNvPr>
@@ -834,8 +794,8 @@
         </p:blipFill>
         <p:spPr>
           <a:xfrm>
-            <a:off x="3272117" y="0"/>
-            <a:ext cx="5647765" cy="6858000"/>
+            <a:off x="0" y="771028"/>
+            <a:ext cx="12192000" cy="5315943"/>
           </a:xfrm>
           <a:prstGeom prst="rect">
             <a:avLst/>
@@ -845,7 +805,7 @@
     </p:spTree>
     <p:extLst>
       <p:ext uri="{BB962C8B-B14F-4D97-AF65-F5344CB8AC3E}">
-        <p14:creationId xmlns:p14="http://schemas.microsoft.com/office/powerpoint/2010/main" val="2524236270"/>
+        <p14:creationId xmlns:p14="http://schemas.microsoft.com/office/powerpoint/2010/main" val="1075539376"/>
       </p:ext>
     </p:extLst>
   </p:cSld>
@@ -2282,8 +2242,8 @@
         </p:nvSpPr>
         <p:spPr>
           <a:xfrm>
-            <a:off x="666330" y="1601588"/>
-            <a:ext cx="10859338" cy="3749040"/>
+            <a:off x="666330" y="1767948"/>
+            <a:ext cx="10859338" cy="3416320"/>
           </a:xfrm>
           <a:prstGeom prst="rect">
             <a:avLst/>
@@ -2304,24 +2264,14 @@
               <a:buAutoNum type="arabicPeriod"/>
             </a:pPr>
             <a:r>
-              <a:rPr lang="en-US" sz="2400">
+              <a:rPr lang="en-US" sz="2400" dirty="0">
                 <a:solidFill>
                   <a:schemeClr val="bg1"/>
                 </a:solidFill>
                 <a:latin typeface="Lato" panose="020F0502020204030203" pitchFamily="34" charset="0"/>
                 <a:ea typeface="Roboto" panose="02000000000000000000" pitchFamily="2" charset="0"/>
               </a:rPr>
-              <a:t>Using Windows 10 </a:t>
-            </a:r>
-            <a:r>
-              <a:rPr lang="en-US" sz="2400" dirty="0">
-                <a:solidFill>
-                  <a:schemeClr val="bg1"/>
-                </a:solidFill>
-                <a:latin typeface="Lato" panose="020F0502020204030203" pitchFamily="34" charset="0"/>
-                <a:ea typeface="Roboto" panose="02000000000000000000" pitchFamily="2" charset="0"/>
-              </a:rPr>
-              <a:t>or Ubuntu 16.04.</a:t>
+              <a:t>Using Windows 10 or Ubuntu 16.04 or MacOS 10.12.*</a:t>
             </a:r>
           </a:p>
           <a:p>
@@ -2677,7 +2627,25 @@
                 </a:solidFill>
                 <a:latin typeface="Lato" panose="020F0502020204030203" pitchFamily="34" charset="0"/>
               </a:rPr>
-              <a:t>Software Engineering at Axon Active Viet Nam.</a:t>
+              <a:t>Software Engineering at Axon Active (</a:t>
+            </a:r>
+            <a:r>
+              <a:rPr lang="en-US" sz="2400" dirty="0" err="1">
+                <a:solidFill>
+                  <a:schemeClr val="bg1"/>
+                </a:solidFill>
+                <a:latin typeface="Lato" panose="020F0502020204030203" pitchFamily="34" charset="0"/>
+              </a:rPr>
+              <a:t>axonactive.com</a:t>
+            </a:r>
+            <a:r>
+              <a:rPr lang="en-US" sz="2400" dirty="0">
+                <a:solidFill>
+                  <a:schemeClr val="bg1"/>
+                </a:solidFill>
+                <a:latin typeface="Lato" panose="020F0502020204030203" pitchFamily="34" charset="0"/>
+              </a:rPr>
+              <a:t>).</a:t>
             </a:r>
           </a:p>
           <a:p>
@@ -2713,7 +2681,7 @@
                 </a:solidFill>
                 <a:latin typeface="Lato" panose="020F0502020204030203" pitchFamily="34" charset="0"/>
               </a:rPr>
-              <a:t>Bachelor Of Software Technology ( late 2018 ).</a:t>
+              <a:t>Bachelor Of Software Technology (mid 2019).</a:t>
             </a:r>
           </a:p>
           <a:p>
@@ -4501,8 +4469,8 @@
         </p:nvSpPr>
         <p:spPr>
           <a:xfrm>
-            <a:off x="303678" y="1775533"/>
-            <a:ext cx="11584646" cy="3306931"/>
+            <a:off x="228849" y="1775533"/>
+            <a:ext cx="11734303" cy="1644937"/>
           </a:xfrm>
           <a:prstGeom prst="rect">
             <a:avLst/>
@@ -4527,7 +4495,7 @@
                 </a:solidFill>
                 <a:latin typeface="Lato" panose="020F0502020204030203" pitchFamily="34" charset="0"/>
               </a:rPr>
-              <a:t>WEB DEVELOPER 2018 ROADMAP</a:t>
+              <a:t>WEB DEVELOPER 2019 ROADMAP</a:t>
             </a:r>
           </a:p>
           <a:p>
@@ -4543,15 +4511,17 @@
                 </a:solidFill>
                 <a:latin typeface="Lato" panose="020F0502020204030203" pitchFamily="34" charset="0"/>
               </a:rPr>
-              <a:t>FOR WHAT YOU ARE LOOKING FOR</a:t>
-            </a:r>
-          </a:p>
-          <a:p>
-            <a:pPr algn="ctr">
-              <a:lnSpc>
-                <a:spcPct val="150000"/>
-              </a:lnSpc>
-            </a:pPr>
+              <a:t>https://</a:t>
+            </a:r>
+            <a:r>
+              <a:rPr lang="en-US" sz="3600" dirty="0" err="1">
+                <a:solidFill>
+                  <a:schemeClr val="bg1"/>
+                </a:solidFill>
+                <a:latin typeface="Lato" panose="020F0502020204030203" pitchFamily="34" charset="0"/>
+              </a:rPr>
+              <a:t>github.com</a:t>
+            </a:r>
             <a:r>
               <a:rPr lang="en-US" sz="3600" dirty="0">
                 <a:solidFill>
@@ -4559,23 +4529,7 @@
                 </a:solidFill>
                 <a:latin typeface="Lato" panose="020F0502020204030203" pitchFamily="34" charset="0"/>
               </a:rPr>
-              <a:t>AND YOUR EXPERIENCE</a:t>
-            </a:r>
-          </a:p>
-          <a:p>
-            <a:pPr algn="ctr">
-              <a:lnSpc>
-                <a:spcPct val="150000"/>
-              </a:lnSpc>
-            </a:pPr>
-            <a:r>
-              <a:rPr lang="en-US" sz="3600" dirty="0">
-                <a:solidFill>
-                  <a:schemeClr val="bg1"/>
-                </a:solidFill>
-                <a:latin typeface="Lato" panose="020F0502020204030203" pitchFamily="34" charset="0"/>
-              </a:rPr>
-              <a:t>FROM github.com/</a:t>
+              <a:t>/</a:t>
             </a:r>
             <a:r>
               <a:rPr lang="en-US" sz="3600" dirty="0" err="1">
@@ -4670,10 +4624,10 @@
       </p:sp>
       <p:pic>
         <p:nvPicPr>
-          <p:cNvPr id="9" name="Picture 8">
-            <a:extLst>
-              <a:ext uri="{FF2B5EF4-FFF2-40B4-BE49-F238E27FC236}">
-                <a16:creationId xmlns:a16="http://schemas.microsoft.com/office/drawing/2014/main" id="{FCDC0ECB-856A-4170-AE25-BF025B16FF24}"/>
+          <p:cNvPr id="4" name="Picture 3" descr="A screenshot of a cell phone&#13;&#10;&#13;&#10;Description automatically generated">
+            <a:extLst>
+              <a:ext uri="{FF2B5EF4-FFF2-40B4-BE49-F238E27FC236}">
+                <a16:creationId xmlns:a16="http://schemas.microsoft.com/office/drawing/2014/main" id="{9E02DD76-CB58-AA46-BE46-EB482C2B6E89}"/>
               </a:ext>
             </a:extLst>
           </p:cNvPr>
@@ -4696,8 +4650,8 @@
         </p:blipFill>
         <p:spPr>
           <a:xfrm>
-            <a:off x="289084" y="903335"/>
-            <a:ext cx="11613832" cy="5051330"/>
+            <a:off x="150365" y="1046603"/>
+            <a:ext cx="11946155" cy="4786787"/>
           </a:xfrm>
           <a:prstGeom prst="rect">
             <a:avLst/>
@@ -4776,10 +4730,10 @@
       </p:sp>
       <p:pic>
         <p:nvPicPr>
-          <p:cNvPr id="4" name="Picture 3">
-            <a:extLst>
-              <a:ext uri="{FF2B5EF4-FFF2-40B4-BE49-F238E27FC236}">
-                <a16:creationId xmlns:a16="http://schemas.microsoft.com/office/drawing/2014/main" id="{5DE0DC54-9FC9-48F1-A101-0C975A816654}"/>
+          <p:cNvPr id="5" name="Picture 4" descr="A close up of a machine&#13;&#10;&#13;&#10;Description automatically generated">
+            <a:extLst>
+              <a:ext uri="{FF2B5EF4-FFF2-40B4-BE49-F238E27FC236}">
+                <a16:creationId xmlns:a16="http://schemas.microsoft.com/office/drawing/2014/main" id="{960C59E2-36E2-6247-A369-86C5D31CE2D4}"/>
               </a:ext>
             </a:extLst>
           </p:cNvPr>
@@ -4802,8 +4756,8 @@
         </p:blipFill>
         <p:spPr>
           <a:xfrm>
-            <a:off x="3317525" y="0"/>
-            <a:ext cx="5556950" cy="6858000"/>
+            <a:off x="4819038" y="0"/>
+            <a:ext cx="2553924" cy="6858000"/>
           </a:xfrm>
           <a:prstGeom prst="rect">
             <a:avLst/>
@@ -4882,10 +4836,10 @@
       </p:sp>
       <p:pic>
         <p:nvPicPr>
-          <p:cNvPr id="5" name="Picture 4">
-            <a:extLst>
-              <a:ext uri="{FF2B5EF4-FFF2-40B4-BE49-F238E27FC236}">
-                <a16:creationId xmlns:a16="http://schemas.microsoft.com/office/drawing/2014/main" id="{1415217C-4FED-4B4D-9FDF-232C97E6D828}"/>
+          <p:cNvPr id="4" name="Picture 3" descr="A screenshot of a computer&#13;&#10;&#13;&#10;Description automatically generated">
+            <a:extLst>
+              <a:ext uri="{FF2B5EF4-FFF2-40B4-BE49-F238E27FC236}">
+                <a16:creationId xmlns:a16="http://schemas.microsoft.com/office/drawing/2014/main" id="{3642A848-289B-284D-AFDB-BB6F952426A6}"/>
               </a:ext>
             </a:extLst>
           </p:cNvPr>
@@ -4908,8 +4862,8 @@
         </p:blipFill>
         <p:spPr>
           <a:xfrm>
-            <a:off x="3734657" y="0"/>
-            <a:ext cx="4722685" cy="6858000"/>
+            <a:off x="4872990" y="0"/>
+            <a:ext cx="2446020" cy="6858000"/>
           </a:xfrm>
           <a:prstGeom prst="rect">
             <a:avLst/>

</xml_diff>

<commit_message>
update thong tin khoa hoc
</commit_message>
<xml_diff>
--- a/HTML-CSS-JS/slides/0-Greeting.pptx
+++ b/HTML-CSS-JS/slides/0-Greeting.pptx
@@ -2694,7 +2694,7 @@
                 </a:solidFill>
                 <a:latin typeface="Lato" panose="020F0502020204030203" pitchFamily="34" charset="0"/>
               </a:rPr>
-              <a:t>Software Engineering at Axon Active (</a:t>
+              <a:t>Scrum Master/Team Leader at Axon Active (</a:t>
             </a:r>
             <a:r>
               <a:rPr lang="en-US" sz="2400" dirty="0" err="1">
@@ -2748,7 +2748,7 @@
                 </a:solidFill>
                 <a:latin typeface="Lato" panose="020F0502020204030203" pitchFamily="34" charset="0"/>
               </a:rPr>
-              <a:t>Bachelor Of Software Technology (mid 2019).</a:t>
+              <a:t>Bachelor Of Software Technology.</a:t>
             </a:r>
           </a:p>
           <a:p>

</xml_diff>